<commit_message>
redesign of title and widescreen all of them
</commit_message>
<xml_diff>
--- a/Lectures/CITS5503AWSIntro.pptx
+++ b/Lectures/CITS5503AWSIntro.pptx
@@ -11,7 +11,7 @@
     <p:handoutMasterId r:id="rId27"/>
   </p:handoutMasterIdLst>
   <p:sldIdLst>
-    <p:sldId id="1325" r:id="rId2"/>
+    <p:sldId id="1333" r:id="rId2"/>
     <p:sldId id="1173" r:id="rId3"/>
     <p:sldId id="1176" r:id="rId4"/>
     <p:sldId id="1177" r:id="rId5"/>
@@ -1782,7 +1782,7 @@
             <a:fld id="{B61BEF0D-F0BB-DE4B-95CE-6DB70DBA9567}" type="datetimeFigureOut">
               <a:rPr lang="en-US" smtClean="0"/>
               <a:pPr/>
-              <a:t>3/13/18</a:t>
+              <a:t>4/9/18</a:t>
             </a:fld>
             <a:endParaRPr lang="en-US" dirty="0"/>
           </a:p>
@@ -1982,7 +1982,7 @@
             <a:fld id="{B61BEF0D-F0BB-DE4B-95CE-6DB70DBA9567}" type="datetimeFigureOut">
               <a:rPr lang="en-US" smtClean="0"/>
               <a:pPr/>
-              <a:t>3/13/18</a:t>
+              <a:t>4/9/18</a:t>
             </a:fld>
             <a:endParaRPr lang="en-US" dirty="0"/>
           </a:p>
@@ -2197,7 +2197,7 @@
             <a:fld id="{B61BEF0D-F0BB-DE4B-95CE-6DB70DBA9567}" type="datetimeFigureOut">
               <a:rPr lang="en-US" smtClean="0"/>
               <a:pPr/>
-              <a:t>3/13/18</a:t>
+              <a:t>4/9/18</a:t>
             </a:fld>
             <a:endParaRPr lang="en-US" dirty="0"/>
           </a:p>
@@ -2737,7 +2737,7 @@
             <a:fld id="{B61BEF0D-F0BB-DE4B-95CE-6DB70DBA9567}" type="datetimeFigureOut">
               <a:rPr lang="en-US" smtClean="0"/>
               <a:pPr/>
-              <a:t>3/13/18</a:t>
+              <a:t>4/9/18</a:t>
             </a:fld>
             <a:endParaRPr lang="en-US" dirty="0"/>
           </a:p>
@@ -3015,7 +3015,7 @@
             <a:fld id="{B61BEF0D-F0BB-DE4B-95CE-6DB70DBA9567}" type="datetimeFigureOut">
               <a:rPr lang="en-US" smtClean="0"/>
               <a:pPr/>
-              <a:t>3/13/18</a:t>
+              <a:t>4/9/18</a:t>
             </a:fld>
             <a:endParaRPr lang="en-US" dirty="0"/>
           </a:p>
@@ -3287,7 +3287,7 @@
             <a:fld id="{B61BEF0D-F0BB-DE4B-95CE-6DB70DBA9567}" type="datetimeFigureOut">
               <a:rPr lang="en-US" smtClean="0"/>
               <a:pPr/>
-              <a:t>3/13/18</a:t>
+              <a:t>4/9/18</a:t>
             </a:fld>
             <a:endParaRPr lang="en-US" dirty="0"/>
           </a:p>
@@ -3706,7 +3706,7 @@
             <a:fld id="{B61BEF0D-F0BB-DE4B-95CE-6DB70DBA9567}" type="datetimeFigureOut">
               <a:rPr lang="en-US" smtClean="0"/>
               <a:pPr/>
-              <a:t>3/13/18</a:t>
+              <a:t>4/9/18</a:t>
             </a:fld>
             <a:endParaRPr lang="en-US" dirty="0"/>
           </a:p>
@@ -3854,7 +3854,7 @@
             <a:fld id="{B61BEF0D-F0BB-DE4B-95CE-6DB70DBA9567}" type="datetimeFigureOut">
               <a:rPr lang="en-US" smtClean="0"/>
               <a:pPr/>
-              <a:t>3/13/18</a:t>
+              <a:t>4/9/18</a:t>
             </a:fld>
             <a:endParaRPr lang="en-US" dirty="0"/>
           </a:p>
@@ -3974,7 +3974,7 @@
             <a:fld id="{B61BEF0D-F0BB-DE4B-95CE-6DB70DBA9567}" type="datetimeFigureOut">
               <a:rPr lang="en-US" smtClean="0"/>
               <a:pPr/>
-              <a:t>3/13/18</a:t>
+              <a:t>4/9/18</a:t>
             </a:fld>
             <a:endParaRPr lang="en-US" dirty="0"/>
           </a:p>
@@ -4292,7 +4292,7 @@
             <a:fld id="{B61BEF0D-F0BB-DE4B-95CE-6DB70DBA9567}" type="datetimeFigureOut">
               <a:rPr lang="en-US" smtClean="0"/>
               <a:pPr/>
-              <a:t>3/13/18</a:t>
+              <a:t>4/9/18</a:t>
             </a:fld>
             <a:endParaRPr lang="en-US" dirty="0"/>
           </a:p>
@@ -4587,7 +4587,7 @@
             <a:fld id="{B61BEF0D-F0BB-DE4B-95CE-6DB70DBA9567}" type="datetimeFigureOut">
               <a:rPr lang="en-US" smtClean="0"/>
               <a:pPr/>
-              <a:t>3/13/18</a:t>
+              <a:t>4/9/18</a:t>
             </a:fld>
             <a:endParaRPr lang="en-US" dirty="0"/>
           </a:p>
@@ -4835,7 +4835,7 @@
             <a:fld id="{B61BEF0D-F0BB-DE4B-95CE-6DB70DBA9567}" type="datetimeFigureOut">
               <a:rPr lang="en-US" smtClean="0"/>
               <a:pPr/>
-              <a:t>3/13/18</a:t>
+              <a:t>4/9/18</a:t>
             </a:fld>
             <a:endParaRPr lang="en-US" dirty="0"/>
           </a:p>
@@ -5241,6 +5241,17 @@
 <file path=ppt/slides/slide1.xml><?xml version="1.0" encoding="utf-8"?>
 <p:sld xmlns:a="http://schemas.openxmlformats.org/drawingml/2006/main" xmlns:r="http://schemas.openxmlformats.org/officeDocument/2006/relationships" xmlns:p="http://schemas.openxmlformats.org/presentationml/2006/main">
   <p:cSld>
+    <p:bg>
+      <p:bgPr>
+        <a:solidFill>
+          <a:schemeClr val="bg1">
+            <a:tint val="95000"/>
+            <a:satMod val="170000"/>
+          </a:schemeClr>
+        </a:solidFill>
+        <a:effectLst/>
+      </p:bgPr>
+    </p:bg>
     <p:spTree>
       <p:nvGrpSpPr>
         <p:cNvPr id="1" name=""/>
@@ -5255,261 +5266,373 @@
           <a:chExt cx="0" cy="0"/>
         </a:xfrm>
       </p:grpSpPr>
-      <p:pic>
-        <p:nvPicPr>
-          <p:cNvPr id="2" name="Picture 1"/>
-          <p:cNvPicPr>
-            <a:picLocks noChangeAspect="1"/>
-          </p:cNvPicPr>
-          <p:nvPr/>
-        </p:nvPicPr>
-        <p:blipFill rotWithShape="1">
-          <a:blip r:embed="rId2">
-            <a:alphaModFix amt="66000"/>
+      <p:grpSp>
+        <p:nvGrpSpPr>
+          <p:cNvPr id="10" name="Group 9" title="intersecting circles">
             <a:extLst>
-              <a:ext uri="{BEBA8EAE-BF5A-486C-A8C5-ECC9F3942E4B}">
-                <a14:imgProps xmlns:a14="http://schemas.microsoft.com/office/drawing/2010/main">
-                  <a14:imgLayer r:embed="rId3">
-                    <a14:imgEffect>
-                      <a14:brightnessContrast bright="-37000" contrast="-22000"/>
-                    </a14:imgEffect>
-                  </a14:imgLayer>
-                </a14:imgProps>
+              <a:ext uri="{FF2B5EF4-FFF2-40B4-BE49-F238E27FC236}">
+                <a16:creationId xmlns:a16="http://schemas.microsoft.com/office/drawing/2014/main" id="{D2C4BFA1-2075-4901-9E24-E41D1FDD51FD}"/>
               </a:ext>
             </a:extLst>
-          </a:blip>
-          <a:srcRect l="25052" r="2" b="2"/>
-          <a:stretch/>
-        </p:blipFill>
+          </p:cNvPr>
+          <p:cNvGrpSpPr>
+            <a:grpSpLocks noGrp="1" noUngrp="1" noRot="1" noChangeAspect="1" noMove="1" noResize="1"/>
+          </p:cNvGrpSpPr>
+          <p:nvPr>
+            <p:extLst>
+              <p:ext uri="{386F3935-93C4-4BCD-93E2-E3B085C9AB24}">
+                <p16:designElem xmlns:p16="http://schemas.microsoft.com/office/powerpoint/2015/main" val="1"/>
+              </p:ext>
+            </p:extLst>
+          </p:nvPr>
+        </p:nvGrpSpPr>
+        <p:grpSpPr>
+          <a:xfrm>
+            <a:off x="1155481" y="498348"/>
+            <a:ext cx="9902663" cy="5861304"/>
+            <a:chOff x="1155481" y="498348"/>
+            <a:chExt cx="9902663" cy="5861304"/>
+          </a:xfrm>
+        </p:grpSpPr>
+        <p:sp>
+          <p:nvSpPr>
+            <p:cNvPr id="11" name="Oval 5">
+              <a:extLst>
+                <a:ext uri="{FF2B5EF4-FFF2-40B4-BE49-F238E27FC236}">
+                  <a16:creationId xmlns:a16="http://schemas.microsoft.com/office/drawing/2014/main" id="{985A7375-E3AF-4F5C-85AE-17E8832952CA}"/>
+                </a:ext>
+              </a:extLst>
+            </p:cNvPr>
+            <p:cNvSpPr>
+              <a:spLocks noChangeArrowheads="1"/>
+            </p:cNvSpPr>
+            <p:nvPr>
+              <p:extLst>
+                <p:ext uri="{386F3935-93C4-4BCD-93E2-E3B085C9AB24}">
+                  <p16:designElem xmlns:p16="http://schemas.microsoft.com/office/powerpoint/2015/main" val="1"/>
+                </p:ext>
+              </p:extLst>
+            </p:nvPr>
+          </p:nvSpPr>
+          <p:spPr bwMode="auto">
+            <a:xfrm>
+              <a:off x="1155481" y="498348"/>
+              <a:ext cx="5861304" cy="5861304"/>
+            </a:xfrm>
+            <a:prstGeom prst="ellipse">
+              <a:avLst/>
+            </a:prstGeom>
+            <a:solidFill>
+              <a:schemeClr val="accent1">
+                <a:alpha val="55000"/>
+              </a:schemeClr>
+            </a:solidFill>
+            <a:ln>
+              <a:noFill/>
+            </a:ln>
+          </p:spPr>
+        </p:sp>
+        <p:sp>
+          <p:nvSpPr>
+            <p:cNvPr id="12" name="Oval 11">
+              <a:extLst>
+                <a:ext uri="{FF2B5EF4-FFF2-40B4-BE49-F238E27FC236}">
+                  <a16:creationId xmlns:a16="http://schemas.microsoft.com/office/drawing/2014/main" id="{F0307F65-8304-4FA8-A841-D4D7625411BE}"/>
+                </a:ext>
+              </a:extLst>
+            </p:cNvPr>
+            <p:cNvSpPr>
+              <a:spLocks noChangeArrowheads="1"/>
+            </p:cNvSpPr>
+            <p:nvPr>
+              <p:extLst>
+                <p:ext uri="{386F3935-93C4-4BCD-93E2-E3B085C9AB24}">
+                  <p16:designElem xmlns:p16="http://schemas.microsoft.com/office/powerpoint/2015/main" val="1"/>
+                </p:ext>
+              </p:extLst>
+            </p:nvPr>
+          </p:nvSpPr>
+          <p:spPr bwMode="auto">
+            <a:xfrm>
+              <a:off x="5196840" y="498348"/>
+              <a:ext cx="5861304" cy="5861304"/>
+            </a:xfrm>
+            <a:prstGeom prst="ellipse">
+              <a:avLst/>
+            </a:prstGeom>
+            <a:solidFill>
+              <a:schemeClr val="accent1">
+                <a:alpha val="55000"/>
+              </a:schemeClr>
+            </a:solidFill>
+            <a:ln>
+              <a:noFill/>
+            </a:ln>
+          </p:spPr>
+        </p:sp>
+        <p:sp>
+          <p:nvSpPr>
+            <p:cNvPr id="13" name="Oval 5">
+              <a:extLst>
+                <a:ext uri="{FF2B5EF4-FFF2-40B4-BE49-F238E27FC236}">
+                  <a16:creationId xmlns:a16="http://schemas.microsoft.com/office/drawing/2014/main" id="{C8B8394C-136F-4E05-A002-D93A5E79CD50}"/>
+                </a:ext>
+              </a:extLst>
+            </p:cNvPr>
+            <p:cNvSpPr>
+              <a:spLocks noChangeArrowheads="1"/>
+            </p:cNvSpPr>
+            <p:nvPr>
+              <p:extLst>
+                <p:ext uri="{386F3935-93C4-4BCD-93E2-E3B085C9AB24}">
+                  <p16:designElem xmlns:p16="http://schemas.microsoft.com/office/powerpoint/2015/main" val="1"/>
+                </p:ext>
+              </p:extLst>
+            </p:nvPr>
+          </p:nvSpPr>
+          <p:spPr bwMode="auto">
+            <a:xfrm>
+              <a:off x="3165348" y="498348"/>
+              <a:ext cx="5861304" cy="5861304"/>
+            </a:xfrm>
+            <a:prstGeom prst="ellipse">
+              <a:avLst/>
+            </a:prstGeom>
+            <a:solidFill>
+              <a:schemeClr val="accent1">
+                <a:alpha val="70000"/>
+              </a:schemeClr>
+            </a:solidFill>
+            <a:ln>
+              <a:noFill/>
+            </a:ln>
+          </p:spPr>
+        </p:sp>
+      </p:grpSp>
+      <p:sp>
+        <p:nvSpPr>
+          <p:cNvPr id="15" name="Rectangle 14" title="ribbon">
+            <a:extLst>
+              <a:ext uri="{FF2B5EF4-FFF2-40B4-BE49-F238E27FC236}">
+                <a16:creationId xmlns:a16="http://schemas.microsoft.com/office/drawing/2014/main" id="{053FB2EE-284F-4C87-AB3D-BBF87A9FAB97}"/>
+              </a:ext>
+            </a:extLst>
+          </p:cNvPr>
+          <p:cNvSpPr>
+            <a:spLocks noGrp="1" noRot="1" noChangeAspect="1" noMove="1" noResize="1" noEditPoints="1" noAdjustHandles="1" noChangeArrowheads="1" noChangeShapeType="1" noTextEdit="1"/>
+          </p:cNvSpPr>
+          <p:nvPr>
+            <p:extLst>
+              <p:ext uri="{386F3935-93C4-4BCD-93E2-E3B085C9AB24}">
+                <p16:designElem xmlns:p16="http://schemas.microsoft.com/office/powerpoint/2015/main" val="1"/>
+              </p:ext>
+            </p:extLst>
+          </p:nvPr>
+        </p:nvSpPr>
         <p:spPr>
           <a:xfrm>
-            <a:off x="1524020" y="10"/>
-            <a:ext cx="9143980" cy="6857990"/>
+            <a:off x="0" y="2514600"/>
+            <a:ext cx="12192000" cy="1828800"/>
           </a:xfrm>
           <a:prstGeom prst="rect">
             <a:avLst/>
           </a:prstGeom>
-        </p:spPr>
-      </p:pic>
-      <p:sp>
-        <p:nvSpPr>
-          <p:cNvPr id="6" name="Title 5"/>
-          <p:cNvSpPr>
-            <a:spLocks noGrp="1"/>
-          </p:cNvSpPr>
-          <p:nvPr>
-            <p:ph type="ctrTitle"/>
-          </p:nvPr>
-        </p:nvSpPr>
-        <p:spPr>
-          <a:xfrm>
-            <a:off x="4814512" y="1200152"/>
-            <a:ext cx="5172879" cy="4457696"/>
-          </a:xfrm>
-        </p:spPr>
-        <p:txBody>
-          <a:bodyPr anchor="ctr">
-            <a:normAutofit/>
-          </a:bodyPr>
-          <a:lstStyle/>
-          <a:p>
-            <a:pPr algn="l"/>
-            <a:r>
-              <a:rPr lang="en-US" sz="7000" dirty="0">
-                <a:solidFill>
-                  <a:srgbClr val="FFFFFF"/>
-                </a:solidFill>
-              </a:rPr>
-              <a:t>Lecture 3</a:t>
-            </a:r>
-          </a:p>
-        </p:txBody>
-      </p:sp>
-      <p:sp>
-        <p:nvSpPr>
-          <p:cNvPr id="7" name="Subtitle 6"/>
-          <p:cNvSpPr>
-            <a:spLocks noGrp="1"/>
-          </p:cNvSpPr>
-          <p:nvPr>
-            <p:ph type="subTitle" idx="1"/>
-          </p:nvPr>
-        </p:nvSpPr>
-        <p:spPr>
-          <a:xfrm>
-            <a:off x="2161473" y="1200152"/>
-            <a:ext cx="2112401" cy="4457696"/>
-          </a:xfrm>
-        </p:spPr>
-        <p:txBody>
-          <a:bodyPr anchor="ctr">
-            <a:normAutofit/>
-          </a:bodyPr>
-          <a:lstStyle/>
-          <a:p>
-            <a:pPr algn="r"/>
-            <a:r>
-              <a:rPr lang="en-US" dirty="0">
-                <a:solidFill>
-                  <a:srgbClr val="FFFFFF"/>
-                </a:solidFill>
-              </a:rPr>
-              <a:t>CITS5503 Cloud Computing</a:t>
-            </a:r>
-          </a:p>
-          <a:p>
-            <a:pPr algn="r"/>
-            <a:r>
-              <a:rPr lang="en-US" dirty="0" err="1">
-                <a:solidFill>
-                  <a:srgbClr val="FFFFFF"/>
-                </a:solidFill>
-              </a:rPr>
-              <a:t>Dr</a:t>
-            </a:r>
-            <a:r>
-              <a:rPr lang="en-US" dirty="0">
-                <a:solidFill>
-                  <a:srgbClr val="FFFFFF"/>
-                </a:solidFill>
-              </a:rPr>
-              <a:t> David Glance</a:t>
-            </a:r>
-          </a:p>
-        </p:txBody>
-      </p:sp>
-      <p:sp>
-        <p:nvSpPr>
-          <p:cNvPr id="4" name="Footer Placeholder 3"/>
-          <p:cNvSpPr>
-            <a:spLocks noGrp="1"/>
-          </p:cNvSpPr>
-          <p:nvPr>
-            <p:ph type="ftr" sz="quarter" idx="11"/>
-          </p:nvPr>
-        </p:nvSpPr>
-        <p:spPr>
-          <a:xfrm>
-            <a:off x="5014721" y="6356351"/>
-            <a:ext cx="4236219" cy="365125"/>
-          </a:xfrm>
-          <a:prstGeom prst="rect">
-            <a:avLst/>
-          </a:prstGeom>
-        </p:spPr>
-        <p:txBody>
-          <a:bodyPr>
-            <a:normAutofit fontScale="92500"/>
-          </a:bodyPr>
-          <a:lstStyle/>
-          <a:p>
-            <a:pPr algn="l"/>
-            <a:r>
-              <a:rPr lang="de-DE" dirty="0" err="1">
-                <a:solidFill>
-                  <a:srgbClr val="FFFFFF"/>
-                </a:solidFill>
-              </a:rPr>
-              <a:t>Based</a:t>
-            </a:r>
-            <a:r>
-              <a:rPr lang="de-DE" dirty="0">
-                <a:solidFill>
-                  <a:srgbClr val="FFFFFF"/>
-                </a:solidFill>
-              </a:rPr>
-              <a:t> on University </a:t>
-            </a:r>
-            <a:r>
-              <a:rPr lang="de-DE" dirty="0" err="1">
-                <a:solidFill>
-                  <a:srgbClr val="FFFFFF"/>
-                </a:solidFill>
-              </a:rPr>
-              <a:t>of</a:t>
-            </a:r>
-            <a:r>
-              <a:rPr lang="de-DE" dirty="0">
-                <a:solidFill>
-                  <a:srgbClr val="FFFFFF"/>
-                </a:solidFill>
-              </a:rPr>
-              <a:t> Pennsylvania NETS212 </a:t>
-            </a:r>
-            <a:r>
-              <a:rPr lang="de-DE" dirty="0" err="1">
-                <a:solidFill>
-                  <a:srgbClr val="FFFFFF"/>
-                </a:solidFill>
-              </a:rPr>
-              <a:t>Haeberlen</a:t>
-            </a:r>
-            <a:r>
-              <a:rPr lang="de-DE" dirty="0">
-                <a:solidFill>
-                  <a:srgbClr val="FFFFFF"/>
-                </a:solidFill>
-              </a:rPr>
-              <a:t>, Z. Ives</a:t>
-            </a:r>
-            <a:endParaRPr lang="en-GB" dirty="0">
-              <a:solidFill>
-                <a:srgbClr val="FFFFFF"/>
-              </a:solidFill>
-            </a:endParaRPr>
-          </a:p>
-        </p:txBody>
-      </p:sp>
-      <p:cxnSp>
-        <p:nvCxnSpPr>
-          <p:cNvPr id="5" name="Straight Connector 4">
-            <a:extLst>
-              <a:ext uri="{FF2B5EF4-FFF2-40B4-BE49-F238E27FC236}">
-                <a16:creationId xmlns:a16="http://schemas.microsoft.com/office/drawing/2014/main" id="{CD3F56E3-8912-C249-BF8B-D1F5A43D2372}"/>
-              </a:ext>
-            </a:extLst>
-          </p:cNvPr>
-          <p:cNvCxnSpPr/>
-          <p:nvPr/>
-        </p:nvCxnSpPr>
-        <p:spPr>
-          <a:xfrm>
-            <a:off x="4504765" y="2474259"/>
-            <a:ext cx="0" cy="1909482"/>
-          </a:xfrm>
-          <a:prstGeom prst="line">
-            <a:avLst/>
-          </a:prstGeom>
-          <a:ln w="25400">
-            <a:solidFill>
-              <a:schemeClr val="bg1"/>
-            </a:solidFill>
+          <a:solidFill>
+            <a:schemeClr val="tx2"/>
+          </a:solidFill>
+          <a:ln>
+            <a:noFill/>
           </a:ln>
         </p:spPr>
         <p:style>
-          <a:lnRef idx="1">
-            <a:schemeClr val="accent1"/>
+          <a:lnRef idx="2">
+            <a:schemeClr val="accent1">
+              <a:shade val="50000"/>
+            </a:schemeClr>
           </a:lnRef>
-          <a:fillRef idx="0">
+          <a:fillRef idx="1">
             <a:schemeClr val="accent1"/>
           </a:fillRef>
           <a:effectRef idx="0">
             <a:schemeClr val="accent1"/>
           </a:effectRef>
           <a:fontRef idx="minor">
-            <a:schemeClr val="tx1"/>
+            <a:schemeClr val="lt1"/>
           </a:fontRef>
         </p:style>
-      </p:cxnSp>
+      </p:sp>
+      <p:sp>
+        <p:nvSpPr>
+          <p:cNvPr id="2" name="Title 1">
+            <a:extLst>
+              <a:ext uri="{FF2B5EF4-FFF2-40B4-BE49-F238E27FC236}">
+                <a16:creationId xmlns:a16="http://schemas.microsoft.com/office/drawing/2014/main" id="{131846B2-0E0C-174C-8D69-DB19736D1380}"/>
+              </a:ext>
+            </a:extLst>
+          </p:cNvPr>
+          <p:cNvSpPr>
+            <a:spLocks noGrp="1"/>
+          </p:cNvSpPr>
+          <p:nvPr>
+            <p:ph type="ctrTitle"/>
+          </p:nvPr>
+        </p:nvSpPr>
+        <p:spPr>
+          <a:xfrm>
+            <a:off x="1524000" y="2776538"/>
+            <a:ext cx="9144000" cy="1381188"/>
+          </a:xfrm>
+        </p:spPr>
+        <p:txBody>
+          <a:bodyPr anchor="ctr">
+            <a:normAutofit/>
+          </a:bodyPr>
+          <a:lstStyle/>
+          <a:p>
+            <a:r>
+              <a:rPr lang="en-US" sz="4000" dirty="0">
+                <a:solidFill>
+                  <a:schemeClr val="bg2"/>
+                </a:solidFill>
+              </a:rPr>
+              <a:t>Amazon Web Services Introduction</a:t>
+            </a:r>
+          </a:p>
+        </p:txBody>
+      </p:sp>
+      <p:sp>
+        <p:nvSpPr>
+          <p:cNvPr id="3" name="Subtitle 2">
+            <a:extLst>
+              <a:ext uri="{FF2B5EF4-FFF2-40B4-BE49-F238E27FC236}">
+                <a16:creationId xmlns:a16="http://schemas.microsoft.com/office/drawing/2014/main" id="{9A4D9E74-78F0-7B49-97EE-4923F9E50B2E}"/>
+              </a:ext>
+            </a:extLst>
+          </p:cNvPr>
+          <p:cNvSpPr>
+            <a:spLocks noGrp="1"/>
+          </p:cNvSpPr>
+          <p:nvPr>
+            <p:ph type="subTitle" idx="1"/>
+          </p:nvPr>
+        </p:nvSpPr>
+        <p:spPr>
+          <a:xfrm>
+            <a:off x="1524000" y="4495800"/>
+            <a:ext cx="9144000" cy="762000"/>
+          </a:xfrm>
+        </p:spPr>
+        <p:txBody>
+          <a:bodyPr>
+            <a:normAutofit/>
+          </a:bodyPr>
+          <a:lstStyle/>
+          <a:p>
+            <a:r>
+              <a:rPr lang="en-US" sz="1800" dirty="0"/>
+              <a:t>CITS5503 </a:t>
+            </a:r>
+            <a:r>
+              <a:rPr lang="en-US" sz="1800" dirty="0" err="1"/>
+              <a:t>Dr</a:t>
+            </a:r>
+            <a:r>
+              <a:rPr lang="en-US" sz="1800" dirty="0"/>
+              <a:t> David Glance</a:t>
+            </a:r>
+          </a:p>
+        </p:txBody>
+      </p:sp>
+      <p:sp>
+        <p:nvSpPr>
+          <p:cNvPr id="4" name="Footer Placeholder 3">
+            <a:extLst>
+              <a:ext uri="{FF2B5EF4-FFF2-40B4-BE49-F238E27FC236}">
+                <a16:creationId xmlns:a16="http://schemas.microsoft.com/office/drawing/2014/main" id="{A8613E2B-95E9-EC4C-961F-B0D475BE8AB5}"/>
+              </a:ext>
+            </a:extLst>
+          </p:cNvPr>
+          <p:cNvSpPr>
+            <a:spLocks noGrp="1"/>
+          </p:cNvSpPr>
+          <p:nvPr>
+            <p:ph type="ftr" sz="quarter" idx="11"/>
+          </p:nvPr>
+        </p:nvSpPr>
+        <p:spPr>
+          <a:xfrm>
+            <a:off x="4038600" y="6356350"/>
+            <a:ext cx="4114800" cy="365125"/>
+          </a:xfrm>
+        </p:spPr>
+        <p:txBody>
+          <a:bodyPr>
+            <a:normAutofit/>
+          </a:bodyPr>
+          <a:lstStyle/>
+          <a:p>
+            <a:endParaRPr lang="en-GB">
+              <a:solidFill>
+                <a:schemeClr val="tx1"/>
+              </a:solidFill>
+            </a:endParaRPr>
+          </a:p>
+        </p:txBody>
+      </p:sp>
+      <p:sp>
+        <p:nvSpPr>
+          <p:cNvPr id="5" name="Slide Number Placeholder 4">
+            <a:extLst>
+              <a:ext uri="{FF2B5EF4-FFF2-40B4-BE49-F238E27FC236}">
+                <a16:creationId xmlns:a16="http://schemas.microsoft.com/office/drawing/2014/main" id="{FEC3278E-459A-4341-A869-C98CE69C11B6}"/>
+              </a:ext>
+            </a:extLst>
+          </p:cNvPr>
+          <p:cNvSpPr>
+            <a:spLocks noGrp="1"/>
+          </p:cNvSpPr>
+          <p:nvPr>
+            <p:ph type="sldNum" sz="quarter" idx="12"/>
+          </p:nvPr>
+        </p:nvSpPr>
+        <p:spPr>
+          <a:xfrm>
+            <a:off x="8610600" y="6356350"/>
+            <a:ext cx="2743200" cy="365125"/>
+          </a:xfrm>
+        </p:spPr>
+        <p:txBody>
+          <a:bodyPr>
+            <a:normAutofit/>
+          </a:bodyPr>
+          <a:lstStyle/>
+          <a:p>
+            <a:fld id="{05072F42-4DFA-4725-86F9-7594E4AB4EB5}" type="slidenum">
+              <a:rPr lang="en-GB">
+                <a:solidFill>
+                  <a:schemeClr val="tx1"/>
+                </a:solidFill>
+              </a:rPr>
+              <a:pPr/>
+              <a:t>2</a:t>
+            </a:fld>
+            <a:endParaRPr lang="en-GB">
+              <a:solidFill>
+                <a:schemeClr val="tx1"/>
+              </a:solidFill>
+            </a:endParaRPr>
+          </a:p>
+        </p:txBody>
+      </p:sp>
     </p:spTree>
     <p:extLst>
       <p:ext uri="{BB962C8B-B14F-4D97-AF65-F5344CB8AC3E}">
-        <p14:creationId xmlns:p14="http://schemas.microsoft.com/office/powerpoint/2010/main" val="3649459556"/>
+        <p14:creationId xmlns:p14="http://schemas.microsoft.com/office/powerpoint/2010/main" val="3198575440"/>
       </p:ext>
     </p:extLst>
   </p:cSld>
   <p:clrMapOvr>
-    <a:masterClrMapping/>
+    <a:overrideClrMapping bg1="dk1" tx1="lt1" bg2="dk2" tx2="lt2" accent1="accent1" accent2="accent2" accent3="accent3" accent4="accent4" accent5="accent5" accent6="accent6" hlink="hlink" folHlink="folHlink"/>
   </p:clrMapOvr>
 </p:sld>
 </file>

</xml_diff>